<commit_message>
#103 - support multiple properties, and also blob and clob
</commit_message>
<xml_diff>
--- a/adocs/documentation/src/main/asciidoc/modules/lib/minio/images/design-sketch.pptx
+++ b/adocs/documentation/src/main/asciidoc/modules/lib/minio/images/design-sketch.pptx
@@ -261,7 +261,7 @@
           <a:p>
             <a:fld id="{4ABBF570-B5A3-4C1B-9C5A-286BC455873B}" type="datetimeFigureOut">
               <a:rPr lang="en-GB" smtClean="0"/>
-              <a:t>15/01/2019</a:t>
+              <a:t>16/01/2019</a:t>
             </a:fld>
             <a:endParaRPr lang="en-GB"/>
           </a:p>
@@ -461,7 +461,7 @@
           <a:p>
             <a:fld id="{4ABBF570-B5A3-4C1B-9C5A-286BC455873B}" type="datetimeFigureOut">
               <a:rPr lang="en-GB" smtClean="0"/>
-              <a:t>15/01/2019</a:t>
+              <a:t>16/01/2019</a:t>
             </a:fld>
             <a:endParaRPr lang="en-GB"/>
           </a:p>
@@ -671,7 +671,7 @@
           <a:p>
             <a:fld id="{4ABBF570-B5A3-4C1B-9C5A-286BC455873B}" type="datetimeFigureOut">
               <a:rPr lang="en-GB" smtClean="0"/>
-              <a:t>15/01/2019</a:t>
+              <a:t>16/01/2019</a:t>
             </a:fld>
             <a:endParaRPr lang="en-GB"/>
           </a:p>
@@ -871,7 +871,7 @@
           <a:p>
             <a:fld id="{4ABBF570-B5A3-4C1B-9C5A-286BC455873B}" type="datetimeFigureOut">
               <a:rPr lang="en-GB" smtClean="0"/>
-              <a:t>15/01/2019</a:t>
+              <a:t>16/01/2019</a:t>
             </a:fld>
             <a:endParaRPr lang="en-GB"/>
           </a:p>
@@ -1147,7 +1147,7 @@
           <a:p>
             <a:fld id="{4ABBF570-B5A3-4C1B-9C5A-286BC455873B}" type="datetimeFigureOut">
               <a:rPr lang="en-GB" smtClean="0"/>
-              <a:t>15/01/2019</a:t>
+              <a:t>16/01/2019</a:t>
             </a:fld>
             <a:endParaRPr lang="en-GB"/>
           </a:p>
@@ -1415,7 +1415,7 @@
           <a:p>
             <a:fld id="{4ABBF570-B5A3-4C1B-9C5A-286BC455873B}" type="datetimeFigureOut">
               <a:rPr lang="en-GB" smtClean="0"/>
-              <a:t>15/01/2019</a:t>
+              <a:t>16/01/2019</a:t>
             </a:fld>
             <a:endParaRPr lang="en-GB"/>
           </a:p>
@@ -1830,7 +1830,7 @@
           <a:p>
             <a:fld id="{4ABBF570-B5A3-4C1B-9C5A-286BC455873B}" type="datetimeFigureOut">
               <a:rPr lang="en-GB" smtClean="0"/>
-              <a:t>15/01/2019</a:t>
+              <a:t>16/01/2019</a:t>
             </a:fld>
             <a:endParaRPr lang="en-GB"/>
           </a:p>
@@ -1972,7 +1972,7 @@
           <a:p>
             <a:fld id="{4ABBF570-B5A3-4C1B-9C5A-286BC455873B}" type="datetimeFigureOut">
               <a:rPr lang="en-GB" smtClean="0"/>
-              <a:t>15/01/2019</a:t>
+              <a:t>16/01/2019</a:t>
             </a:fld>
             <a:endParaRPr lang="en-GB"/>
           </a:p>
@@ -2085,7 +2085,7 @@
           <a:p>
             <a:fld id="{4ABBF570-B5A3-4C1B-9C5A-286BC455873B}" type="datetimeFigureOut">
               <a:rPr lang="en-GB" smtClean="0"/>
-              <a:t>15/01/2019</a:t>
+              <a:t>16/01/2019</a:t>
             </a:fld>
             <a:endParaRPr lang="en-GB"/>
           </a:p>
@@ -2398,7 +2398,7 @@
           <a:p>
             <a:fld id="{4ABBF570-B5A3-4C1B-9C5A-286BC455873B}" type="datetimeFigureOut">
               <a:rPr lang="en-GB" smtClean="0"/>
-              <a:t>15/01/2019</a:t>
+              <a:t>16/01/2019</a:t>
             </a:fld>
             <a:endParaRPr lang="en-GB"/>
           </a:p>
@@ -2687,7 +2687,7 @@
           <a:p>
             <a:fld id="{4ABBF570-B5A3-4C1B-9C5A-286BC455873B}" type="datetimeFigureOut">
               <a:rPr lang="en-GB" smtClean="0"/>
-              <a:t>15/01/2019</a:t>
+              <a:t>16/01/2019</a:t>
             </a:fld>
             <a:endParaRPr lang="en-GB"/>
           </a:p>
@@ -2930,7 +2930,7 @@
           <a:p>
             <a:fld id="{4ABBF570-B5A3-4C1B-9C5A-286BC455873B}" type="datetimeFigureOut">
               <a:rPr lang="en-GB" smtClean="0"/>
-              <a:t>15/01/2019</a:t>
+              <a:t>16/01/2019</a:t>
             </a:fld>
             <a:endParaRPr lang="en-GB"/>
           </a:p>
@@ -3524,7 +3524,7 @@
         <p:spPr>
           <a:xfrm>
             <a:off x="7292546" y="1119524"/>
-            <a:ext cx="2802923" cy="1885658"/>
+            <a:ext cx="3321410" cy="1885658"/>
           </a:xfrm>
           <a:prstGeom prst="rect">
             <a:avLst/>
@@ -3627,7 +3627,7 @@
         <p:spPr>
           <a:xfrm>
             <a:off x="7292546" y="2488682"/>
-            <a:ext cx="2022390" cy="516500"/>
+            <a:ext cx="2750356" cy="516500"/>
           </a:xfrm>
           <a:prstGeom prst="rect">
             <a:avLst/>
@@ -3653,25 +3653,25 @@
           <a:p>
             <a:pPr algn="ctr"/>
             <a:r>
-              <a:rPr lang="en-GB" sz="1100" dirty="0"/>
+              <a:rPr lang="en-GB" sz="1050" dirty="0"/>
               <a:t>&lt;&lt;</a:t>
             </a:r>
             <a:r>
-              <a:rPr lang="en-GB" sz="1100" dirty="0" err="1"/>
-              <a:t>docserver</a:t>
-            </a:r>
-            <a:r>
-              <a:rPr lang="en-GB" sz="1100" dirty="0"/>
+              <a:rPr lang="en-GB" sz="1050" dirty="0" err="1"/>
+              <a:t>dopserver</a:t>
+            </a:r>
+            <a:r>
+              <a:rPr lang="en-GB" sz="1050" dirty="0"/>
               <a:t>&gt;&gt; </a:t>
             </a:r>
             <a:br>
-              <a:rPr lang="en-GB" sz="1100" dirty="0"/>
+              <a:rPr lang="en-GB" sz="1050" dirty="0"/>
             </a:br>
             <a:r>
-              <a:rPr lang="en-GB" dirty="0" err="1"/>
-              <a:t>DocBlobService</a:t>
-            </a:r>
-            <a:endParaRPr lang="en-GB" dirty="0"/>
+              <a:rPr lang="en-GB" sz="1600" dirty="0" err="1"/>
+              <a:t>DomainObjectPropertyService</a:t>
+            </a:r>
+            <a:endParaRPr lang="en-GB" sz="1600" dirty="0"/>
           </a:p>
         </p:txBody>
       </p:sp>
@@ -3795,7 +3795,7 @@
             </a:br>
             <a:r>
               <a:rPr lang="en-GB" dirty="0" err="1"/>
-              <a:t>MinioBlob</a:t>
+              <a:t>MinioUpload</a:t>
             </a:r>
             <a:r>
               <a:rPr lang="en-GB" dirty="0"/>
@@ -3819,7 +3819,7 @@
         <p:spPr>
           <a:xfrm>
             <a:off x="6326325" y="3911160"/>
-            <a:ext cx="1514733" cy="737287"/>
+            <a:ext cx="1590978" cy="737287"/>
           </a:xfrm>
           <a:prstGeom prst="rect">
             <a:avLst/>
@@ -3845,31 +3845,32 @@
           <a:p>
             <a:pPr algn="ctr"/>
             <a:r>
-              <a:rPr lang="en-GB" sz="1100" dirty="0"/>
+              <a:rPr lang="en-GB" sz="1050" dirty="0"/>
               <a:t>&lt;&lt;</a:t>
             </a:r>
             <a:r>
-              <a:rPr lang="en-GB" sz="1100" dirty="0" err="1"/>
-              <a:t>docclient</a:t>
-            </a:r>
-            <a:r>
-              <a:rPr lang="en-GB" sz="1100" dirty="0"/>
+              <a:rPr lang="en-GB" sz="1050" dirty="0" err="1"/>
+              <a:t>dopclient</a:t>
+            </a:r>
+            <a:r>
+              <a:rPr lang="en-GB" sz="1050" dirty="0"/>
               <a:t>&gt;&gt;</a:t>
             </a:r>
             <a:br>
-              <a:rPr lang="en-GB" dirty="0"/>
+              <a:rPr lang="en-GB" sz="1600" dirty="0"/>
             </a:br>
             <a:r>
-              <a:rPr lang="en-GB" dirty="0" err="1"/>
-              <a:t>DocBlob</a:t>
+              <a:rPr lang="en-GB" sz="1600" dirty="0" err="1"/>
+              <a:t>DomainObject</a:t>
             </a:r>
             <a:br>
-              <a:rPr lang="en-GB" dirty="0"/>
+              <a:rPr lang="en-GB" sz="1600" dirty="0"/>
             </a:br>
             <a:r>
-              <a:rPr lang="en-GB" dirty="0"/>
-              <a:t>Client</a:t>
-            </a:r>
+              <a:rPr lang="en-GB" sz="1600" dirty="0" err="1"/>
+              <a:t>PropertyClient</a:t>
+            </a:r>
+            <a:endParaRPr lang="en-GB" sz="1600" dirty="0"/>
           </a:p>
         </p:txBody>
       </p:sp>
@@ -3883,6 +3884,7 @@
             </a:extLst>
           </p:cNvPr>
           <p:cNvCxnSpPr>
+            <a:cxnSpLocks/>
             <a:stCxn id="9" idx="0"/>
             <a:endCxn id="11" idx="1"/>
           </p:cNvCxnSpPr>
@@ -3933,8 +3935,8 @@
         </p:nvCxnSpPr>
         <p:spPr>
           <a:xfrm rot="5400000" flipH="1" flipV="1">
-            <a:off x="6606005" y="3224619"/>
-            <a:ext cx="1164228" cy="208854"/>
+            <a:off x="6625066" y="3243680"/>
+            <a:ext cx="1164228" cy="170732"/>
           </a:xfrm>
           <a:prstGeom prst="curvedConnector2">
             <a:avLst/>
@@ -4353,8 +4355,8 @@
         </p:nvCxnSpPr>
         <p:spPr>
           <a:xfrm flipV="1">
-            <a:off x="7841058" y="3005182"/>
-            <a:ext cx="462683" cy="1274622"/>
+            <a:off x="7917303" y="3005182"/>
+            <a:ext cx="750421" cy="1274622"/>
           </a:xfrm>
           <a:prstGeom prst="curvedConnector2">
             <a:avLst/>
@@ -4440,7 +4442,7 @@
         <p:spPr>
           <a:xfrm flipV="1">
             <a:off x="5598160" y="4648447"/>
-            <a:ext cx="1485532" cy="791617"/>
+            <a:ext cx="1523654" cy="791617"/>
           </a:xfrm>
           <a:prstGeom prst="curvedConnector2">
             <a:avLst/>
@@ -4572,8 +4574,8 @@
         </p:nvCxnSpPr>
         <p:spPr>
           <a:xfrm rot="16200000" flipV="1">
-            <a:off x="9928286" y="2229536"/>
-            <a:ext cx="1439568" cy="1105202"/>
+            <a:off x="10187530" y="2488779"/>
+            <a:ext cx="1439568" cy="586715"/>
           </a:xfrm>
           <a:prstGeom prst="curvedConnector2">
             <a:avLst/>
@@ -4656,7 +4658,7 @@
         </p:nvSpPr>
         <p:spPr>
           <a:xfrm>
-            <a:off x="10613956" y="2100456"/>
+            <a:off x="10753439" y="1705250"/>
             <a:ext cx="1107419" cy="461665"/>
           </a:xfrm>
           <a:prstGeom prst="rect">
@@ -4732,8 +4734,8 @@
         </p:nvSpPr>
         <p:spPr>
           <a:xfrm>
-            <a:off x="7554663" y="1417735"/>
-            <a:ext cx="1266055" cy="793723"/>
+            <a:off x="7371371" y="1417735"/>
+            <a:ext cx="1928609" cy="793723"/>
           </a:xfrm>
           <a:prstGeom prst="rect">
             <a:avLst/>
@@ -4764,7 +4766,7 @@
             </a:r>
             <a:r>
               <a:rPr lang="en-GB" sz="900" dirty="0" err="1"/>
-              <a:t>docserver</a:t>
+              <a:t>dopserver</a:t>
             </a:r>
             <a:r>
               <a:rPr lang="en-GB" sz="900" dirty="0"/>
@@ -4790,7 +4792,7 @@
             </a:br>
             <a:r>
               <a:rPr lang="en-GB" sz="1400" dirty="0" err="1"/>
-              <a:t>DocBlob</a:t>
+              <a:t>DomainObjectProperty</a:t>
             </a:r>
             <a:br>
               <a:rPr lang="en-GB" sz="1400" dirty="0"/>
@@ -4821,8 +4823,8 @@
         </p:nvCxnSpPr>
         <p:spPr>
           <a:xfrm rot="16200000" flipV="1">
-            <a:off x="8107104" y="2292045"/>
-            <a:ext cx="277224" cy="116050"/>
+            <a:off x="8363088" y="2184046"/>
+            <a:ext cx="277224" cy="332048"/>
           </a:xfrm>
           <a:prstGeom prst="curvedConnector3">
             <a:avLst>

</xml_diff>